<commit_message>
getting ready for oop class
</commit_message>
<xml_diff>
--- a/ClassMaterials/ProgramsAboutSlists/08-ProgramsAboutSlists.pptx
+++ b/ClassMaterials/ProgramsAboutSlists/08-ProgramsAboutSlists.pptx
@@ -168,7 +168,7 @@
   <pc:docChgLst>
     <pc:chgData name="Hewner, Mike" userId="7f3f83dd-6dfb-4127-a87f-c1714bd4fac9" providerId="ADAL" clId="{0759EFC5-DC3A-42BC-AE83-920ED47B7FCD}"/>
     <pc:docChg chg="custSel modSld">
-      <pc:chgData name="Hewner, Mike" userId="7f3f83dd-6dfb-4127-a87f-c1714bd4fac9" providerId="ADAL" clId="{0759EFC5-DC3A-42BC-AE83-920ED47B7FCD}" dt="2021-09-14T12:26:17.645" v="40" actId="20577"/>
+      <pc:chgData name="Hewner, Mike" userId="7f3f83dd-6dfb-4127-a87f-c1714bd4fac9" providerId="ADAL" clId="{0759EFC5-DC3A-42BC-AE83-920ED47B7FCD}" dt="2021-09-14T19:05:44.997" v="52" actId="20577"/>
       <pc:docMkLst>
         <pc:docMk/>
       </pc:docMkLst>
@@ -203,13 +203,13 @@
         </pc:spChg>
       </pc:sldChg>
       <pc:sldChg chg="modSp mod">
-        <pc:chgData name="Hewner, Mike" userId="7f3f83dd-6dfb-4127-a87f-c1714bd4fac9" providerId="ADAL" clId="{0759EFC5-DC3A-42BC-AE83-920ED47B7FCD}" dt="2021-09-14T12:20:50.380" v="22" actId="20577"/>
+        <pc:chgData name="Hewner, Mike" userId="7f3f83dd-6dfb-4127-a87f-c1714bd4fac9" providerId="ADAL" clId="{0759EFC5-DC3A-42BC-AE83-920ED47B7FCD}" dt="2021-09-14T19:05:44.997" v="52" actId="20577"/>
         <pc:sldMkLst>
           <pc:docMk/>
           <pc:sldMk cId="1586352250" sldId="408"/>
         </pc:sldMkLst>
         <pc:spChg chg="mod">
-          <ac:chgData name="Hewner, Mike" userId="7f3f83dd-6dfb-4127-a87f-c1714bd4fac9" providerId="ADAL" clId="{0759EFC5-DC3A-42BC-AE83-920ED47B7FCD}" dt="2021-09-14T12:20:50.380" v="22" actId="20577"/>
+          <ac:chgData name="Hewner, Mike" userId="7f3f83dd-6dfb-4127-a87f-c1714bd4fac9" providerId="ADAL" clId="{0759EFC5-DC3A-42BC-AE83-920ED47B7FCD}" dt="2021-09-14T19:05:44.997" v="52" actId="20577"/>
           <ac:spMkLst>
             <pc:docMk/>
             <pc:sldMk cId="1586352250" sldId="408"/>
@@ -6856,7 +6856,15 @@
           <a:p>
             <a:r>
               <a:rPr lang="en-US" sz="2800" dirty="0"/>
-              <a:t>1. “Written” part on Moodle.  Closed book, notes, etc.  25-40%</a:t>
+              <a:t>1</a:t>
+            </a:r>
+            <a:r>
+              <a:rPr lang="en-US" sz="2800"/>
+              <a:t>. Written </a:t>
+            </a:r>
+            <a:r>
+              <a:rPr lang="en-US" sz="2800" dirty="0"/>
+              <a:t>part.  Closed book, notes, etc.  25-40%</a:t>
             </a:r>
           </a:p>
           <a:p>

</xml_diff>